<commit_message>
Attempts at avoiding getting stuck
Still gets stuck though :(
 - added debug mode
 - changed sampling frequency to 100Hz
 - added volatiles 
 - consensus timeout
</commit_message>
<xml_diff>
--- a/consensus flowchart.pptx
+++ b/consensus flowchart.pptx
@@ -104,6 +104,11 @@
       </a:defRPr>
     </a:lvl9pPr>
   </p:defaultTextStyle>
+  <p:extLst>
+    <p:ext uri="{EFAFB233-063F-42B5-8137-9DF3F51BA10A}">
+      <p15:sldGuideLst xmlns:p15="http://schemas.microsoft.com/office/powerpoint/2012/main"/>
+    </p:ext>
+  </p:extLst>
 </p:presentation>
 </file>
 
@@ -238,7 +243,7 @@
           <a:p>
             <a:fld id="{429765E0-3C7A-47ED-9B64-DA681E75DA07}" type="datetimeFigureOut">
               <a:rPr lang="pt-PT" smtClean="0"/>
-              <a:t>03/12/2018</a:t>
+              <a:t>14/12/2018</a:t>
             </a:fld>
             <a:endParaRPr lang="pt-PT"/>
           </a:p>
@@ -408,7 +413,7 @@
           <a:p>
             <a:fld id="{429765E0-3C7A-47ED-9B64-DA681E75DA07}" type="datetimeFigureOut">
               <a:rPr lang="pt-PT" smtClean="0"/>
-              <a:t>03/12/2018</a:t>
+              <a:t>14/12/2018</a:t>
             </a:fld>
             <a:endParaRPr lang="pt-PT"/>
           </a:p>
@@ -588,7 +593,7 @@
           <a:p>
             <a:fld id="{429765E0-3C7A-47ED-9B64-DA681E75DA07}" type="datetimeFigureOut">
               <a:rPr lang="pt-PT" smtClean="0"/>
-              <a:t>03/12/2018</a:t>
+              <a:t>14/12/2018</a:t>
             </a:fld>
             <a:endParaRPr lang="pt-PT"/>
           </a:p>
@@ -758,7 +763,7 @@
           <a:p>
             <a:fld id="{429765E0-3C7A-47ED-9B64-DA681E75DA07}" type="datetimeFigureOut">
               <a:rPr lang="pt-PT" smtClean="0"/>
-              <a:t>03/12/2018</a:t>
+              <a:t>14/12/2018</a:t>
             </a:fld>
             <a:endParaRPr lang="pt-PT"/>
           </a:p>
@@ -1002,7 +1007,7 @@
           <a:p>
             <a:fld id="{429765E0-3C7A-47ED-9B64-DA681E75DA07}" type="datetimeFigureOut">
               <a:rPr lang="pt-PT" smtClean="0"/>
-              <a:t>03/12/2018</a:t>
+              <a:t>14/12/2018</a:t>
             </a:fld>
             <a:endParaRPr lang="pt-PT"/>
           </a:p>
@@ -1234,7 +1239,7 @@
           <a:p>
             <a:fld id="{429765E0-3C7A-47ED-9B64-DA681E75DA07}" type="datetimeFigureOut">
               <a:rPr lang="pt-PT" smtClean="0"/>
-              <a:t>03/12/2018</a:t>
+              <a:t>14/12/2018</a:t>
             </a:fld>
             <a:endParaRPr lang="pt-PT"/>
           </a:p>
@@ -1601,7 +1606,7 @@
           <a:p>
             <a:fld id="{429765E0-3C7A-47ED-9B64-DA681E75DA07}" type="datetimeFigureOut">
               <a:rPr lang="pt-PT" smtClean="0"/>
-              <a:t>03/12/2018</a:t>
+              <a:t>14/12/2018</a:t>
             </a:fld>
             <a:endParaRPr lang="pt-PT"/>
           </a:p>
@@ -1719,7 +1724,7 @@
           <a:p>
             <a:fld id="{429765E0-3C7A-47ED-9B64-DA681E75DA07}" type="datetimeFigureOut">
               <a:rPr lang="pt-PT" smtClean="0"/>
-              <a:t>03/12/2018</a:t>
+              <a:t>14/12/2018</a:t>
             </a:fld>
             <a:endParaRPr lang="pt-PT"/>
           </a:p>
@@ -1814,7 +1819,7 @@
           <a:p>
             <a:fld id="{429765E0-3C7A-47ED-9B64-DA681E75DA07}" type="datetimeFigureOut">
               <a:rPr lang="pt-PT" smtClean="0"/>
-              <a:t>03/12/2018</a:t>
+              <a:t>14/12/2018</a:t>
             </a:fld>
             <a:endParaRPr lang="pt-PT"/>
           </a:p>
@@ -2091,7 +2096,7 @@
           <a:p>
             <a:fld id="{429765E0-3C7A-47ED-9B64-DA681E75DA07}" type="datetimeFigureOut">
               <a:rPr lang="pt-PT" smtClean="0"/>
-              <a:t>03/12/2018</a:t>
+              <a:t>14/12/2018</a:t>
             </a:fld>
             <a:endParaRPr lang="pt-PT"/>
           </a:p>
@@ -2348,7 +2353,7 @@
           <a:p>
             <a:fld id="{429765E0-3C7A-47ED-9B64-DA681E75DA07}" type="datetimeFigureOut">
               <a:rPr lang="pt-PT" smtClean="0"/>
-              <a:t>03/12/2018</a:t>
+              <a:t>14/12/2018</a:t>
             </a:fld>
             <a:endParaRPr lang="pt-PT"/>
           </a:p>
@@ -2561,7 +2566,7 @@
           <a:p>
             <a:fld id="{429765E0-3C7A-47ED-9B64-DA681E75DA07}" type="datetimeFigureOut">
               <a:rPr lang="pt-PT" smtClean="0"/>
-              <a:t>03/12/2018</a:t>
+              <a:t>14/12/2018</a:t>
             </a:fld>
             <a:endParaRPr lang="pt-PT"/>
           </a:p>
@@ -3318,11 +3323,11 @@
             </a:r>
             <a:r>
               <a:rPr lang="pt-PT" b="1" dirty="0" err="1"/>
-              <a:t>agent’s</a:t>
+              <a:t>agents</a:t>
             </a:r>
             <a:r>
               <a:rPr lang="pt-PT" b="1" dirty="0"/>
-              <a:t> </a:t>
+              <a:t>’ </a:t>
             </a:r>
             <a:r>
               <a:rPr lang="pt-PT" b="1" dirty="0" err="1"/>

</xml_diff>